<commit_message>
Update AWS solution presales documents with partner credits and formatting improvements
</commit_message>
<xml_diff>
--- a/solutions/aws/ai/intelligent-document-processing/delivery/closeout-presentation.pptx
+++ b/solutions/aws/ai/intelligent-document-processing/delivery/closeout-presentation.pptx
@@ -3955,7 +3955,7 @@
                     <a:lstStyle/>
                     <a:p>
                       <a:r>
-                        <a:rPr sz="1100"/>
+                        <a:rPr b="1" sz="1100"/>
                         <a:t>Operational Efficiency</a:t>
                       </a:r>
                     </a:p>
@@ -3972,7 +3972,7 @@
                     <a:lstStyle/>
                     <a:p>
                       <a:r>
-                        <a:rPr sz="1100"/>
+                        <a:rPr b="1" sz="1100"/>
                         <a:t>70% efficiency gain</a:t>
                       </a:r>
                     </a:p>
@@ -3989,7 +3989,7 @@
                     <a:lstStyle/>
                     <a:p>
                       <a:r>
-                        <a:rPr sz="1100"/>
+                        <a:rPr b="1" sz="1100"/>
                         <a:t>75% efficiency gain</a:t>
                       </a:r>
                     </a:p>
@@ -4006,7 +4006,7 @@
                     <a:lstStyle/>
                     <a:p>
                       <a:r>
-                        <a:rPr sz="1100"/>
+                        <a:rPr b="1" sz="1100"/>
                         <a:t>Throughput measurement</a:t>
                       </a:r>
                     </a:p>
@@ -4023,7 +4023,7 @@
                     <a:lstStyle/>
                     <a:p>
                       <a:r>
-                        <a:rPr sz="1100"/>
+                        <a:rPr b="1" sz="1100"/>
                         <a:t>Within 60 days</a:t>
                       </a:r>
                     </a:p>
@@ -4904,7 +4904,7 @@
                     <a:lstStyle/>
                     <a:p>
                       <a:r>
-                        <a:rPr sz="1100"/>
+                        <a:rPr b="1" sz="1100"/>
                         <a:t>User Change Resistance</a:t>
                       </a:r>
                     </a:p>
@@ -4921,7 +4921,7 @@
                     <a:lstStyle/>
                     <a:p>
                       <a:r>
-                        <a:rPr sz="1100"/>
+                        <a:rPr b="1" sz="1100"/>
                         <a:t>Slower initial adoption</a:t>
                       </a:r>
                     </a:p>
@@ -4938,7 +4938,7 @@
                     <a:lstStyle/>
                     <a:p>
                       <a:r>
-                        <a:rPr sz="1100"/>
+                        <a:rPr b="1" sz="1100"/>
                         <a:t>Enhanced training and change management</a:t>
                       </a:r>
                     </a:p>
@@ -4955,7 +4955,7 @@
                     <a:lstStyle/>
                     <a:p>
                       <a:r>
-                        <a:rPr sz="1100"/>
+                        <a:rPr b="1" sz="1100"/>
                         <a:t>Increase change management investment</a:t>
                       </a:r>
                     </a:p>
@@ -6043,7 +6043,7 @@
                     <a:lstStyle/>
                     <a:p>
                       <a:r>
-                        <a:rPr sz="1100"/>
+                        <a:rPr b="1" sz="1100"/>
                         <a:t>Workflow Automation</a:t>
                       </a:r>
                     </a:p>
@@ -6060,7 +6060,7 @@
                     <a:lstStyle/>
                     <a:p>
                       <a:r>
-                        <a:rPr sz="1100"/>
+                        <a:rPr b="1" sz="1100"/>
                         <a:t>End-to-end process automation</a:t>
                       </a:r>
                     </a:p>
@@ -6077,7 +6077,7 @@
                     <a:lstStyle/>
                     <a:p>
                       <a:r>
-                        <a:rPr sz="1100"/>
+                        <a:rPr b="1" sz="1100"/>
                         <a:t>High</a:t>
                       </a:r>
                     </a:p>
@@ -6094,7 +6094,7 @@
                     <a:lstStyle/>
                     <a:p>
                       <a:r>
-                        <a:rPr sz="1100"/>
+                        <a:rPr b="1" sz="1100"/>
                         <a:t>6-12 months</a:t>
                       </a:r>
                     </a:p>
@@ -6111,7 +6111,7 @@
                     <a:lstStyle/>
                     <a:p>
                       <a:r>
-                        <a:rPr sz="1100"/>
+                        <a:rPr b="1" sz="1100"/>
                         <a:t>High</a:t>
                       </a:r>
                     </a:p>
@@ -8486,7 +8486,7 @@
                     <a:lstStyle/>
                     <a:p>
                       <a:r>
-                        <a:rPr sz="1100"/>
+                        <a:rPr b="1" sz="1100"/>
                         <a:t>ML Model Training</a:t>
                       </a:r>
                     </a:p>
@@ -8503,7 +8503,7 @@
                     <a:lstStyle/>
                     <a:p>
                       <a:r>
-                        <a:rPr sz="1100"/>
+                        <a:rPr b="1" sz="1100"/>
                         <a:t>Custom models</a:t>
                       </a:r>
                     </a:p>
@@ -8520,7 +8520,7 @@
                     <a:lstStyle/>
                     <a:p>
                       <a:r>
-                        <a:rPr sz="1100"/>
+                        <a:rPr b="1" sz="1100"/>
                         <a:t>Production-ready classification models</a:t>
                       </a:r>
                     </a:p>
@@ -8537,7 +8537,7 @@
                     <a:lstStyle/>
                     <a:p>
                       <a:r>
-                        <a:rPr sz="1100"/>
+                        <a:rPr b="1" sz="1100"/>
                         <a:t>✅ Complete</a:t>
                       </a:r>
                     </a:p>
@@ -8554,7 +8554,7 @@
                     <a:lstStyle/>
                     <a:p>
                       <a:r>
-                        <a:rPr sz="1100"/>
+                        <a:rPr b="1" sz="1100"/>
                         <a:t>Continuous learning capability</a:t>
                       </a:r>
                     </a:p>
@@ -9490,7 +9490,7 @@
                     <a:lstStyle/>
                     <a:p>
                       <a:r>
-                        <a:rPr sz="1100"/>
+                        <a:rPr b="1" sz="1100"/>
                         <a:t>Batch Processing</a:t>
                       </a:r>
                     </a:p>
@@ -9507,7 +9507,7 @@
                     <a:lstStyle/>
                     <a:p>
                       <a:r>
-                        <a:rPr sz="1100"/>
+                        <a:rPr b="1" sz="1100"/>
                         <a:t>High-volume document handling</a:t>
                       </a:r>
                     </a:p>
@@ -9524,7 +9524,7 @@
                     <a:lstStyle/>
                     <a:p>
                       <a:r>
-                        <a:rPr sz="1100"/>
+                        <a:rPr b="1" sz="1100"/>
                         <a:t>Efficient bulk processing</a:t>
                       </a:r>
                     </a:p>
@@ -9541,7 +9541,7 @@
                     <a:lstStyle/>
                     <a:p>
                       <a:r>
-                        <a:rPr sz="1100"/>
+                        <a:rPr b="1" sz="1100"/>
                         <a:t>Medium</a:t>
                       </a:r>
                     </a:p>
@@ -9558,7 +9558,7 @@
                     <a:lstStyle/>
                     <a:p>
                       <a:r>
-                        <a:rPr sz="1100"/>
+                        <a:rPr b="1" sz="1100"/>
                         <a:t>✅ Delivered</a:t>
                       </a:r>
                     </a:p>

</xml_diff>